<commit_message>
updated for extra data
</commit_message>
<xml_diff>
--- a/Presentation colour legend.pptx
+++ b/Presentation colour legend.pptx
@@ -126,7 +126,7 @@
 <file path=ppt/revisionInfo.xml><?xml version="1.0" encoding="utf-8"?>
 <p1510:revInfo xmlns:a="http://schemas.openxmlformats.org/drawingml/2006/main" xmlns:r="http://schemas.openxmlformats.org/officeDocument/2006/relationships" xmlns:p1510="http://schemas.microsoft.com/office/powerpoint/2015/10/main">
   <p1510:revLst>
-    <p1510:client id="{C0C8088B-EF5A-4A28-AF3A-284F851ABD3A}" v="2" dt="2019-10-21T15:15:24.974"/>
+    <p1510:client id="{C0C8088B-EF5A-4A28-AF3A-284F851ABD3A}" v="2" dt="2019-10-23T15:24:35.997"/>
   </p1510:revLst>
 </p1510:revInfo>
 </file>
@@ -136,82 +136,82 @@
   <pc:docChgLst>
     <pc:chgData name="Andrew Baxter (student)" userId="b45e9002-b033-421d-a3d9-6d42475e9a3f" providerId="ADAL" clId="{C0C8088B-EF5A-4A28-AF3A-284F851ABD3A}"/>
     <pc:docChg chg="custSel modSld">
-      <pc:chgData name="Andrew Baxter (student)" userId="b45e9002-b033-421d-a3d9-6d42475e9a3f" providerId="ADAL" clId="{C0C8088B-EF5A-4A28-AF3A-284F851ABD3A}" dt="2019-10-21T15:15:24.973" v="3" actId="164"/>
+      <pc:chgData name="Andrew Baxter (student)" userId="b45e9002-b033-421d-a3d9-6d42475e9a3f" providerId="ADAL" clId="{C0C8088B-EF5A-4A28-AF3A-284F851ABD3A}" dt="2019-10-23T15:24:35.997" v="2" actId="164"/>
       <pc:docMkLst>
         <pc:docMk/>
       </pc:docMkLst>
       <pc:sldChg chg="addSp delSp modSp">
-        <pc:chgData name="Andrew Baxter (student)" userId="b45e9002-b033-421d-a3d9-6d42475e9a3f" providerId="ADAL" clId="{C0C8088B-EF5A-4A28-AF3A-284F851ABD3A}" dt="2019-10-21T15:15:24.973" v="3" actId="164"/>
+        <pc:chgData name="Andrew Baxter (student)" userId="b45e9002-b033-421d-a3d9-6d42475e9a3f" providerId="ADAL" clId="{C0C8088B-EF5A-4A28-AF3A-284F851ABD3A}" dt="2019-10-23T15:24:35.997" v="2" actId="164"/>
         <pc:sldMkLst>
           <pc:docMk/>
           <pc:sldMk cId="0" sldId="256"/>
         </pc:sldMkLst>
         <pc:spChg chg="del mod topLvl">
-          <ac:chgData name="Andrew Baxter (student)" userId="b45e9002-b033-421d-a3d9-6d42475e9a3f" providerId="ADAL" clId="{C0C8088B-EF5A-4A28-AF3A-284F851ABD3A}" dt="2019-10-21T15:15:14.435" v="1" actId="478"/>
+          <ac:chgData name="Andrew Baxter (student)" userId="b45e9002-b033-421d-a3d9-6d42475e9a3f" providerId="ADAL" clId="{C0C8088B-EF5A-4A28-AF3A-284F851ABD3A}" dt="2019-10-23T15:24:32.617" v="1" actId="478"/>
           <ac:spMkLst>
             <pc:docMk/>
             <pc:sldMk cId="0" sldId="256"/>
             <ac:spMk id="3" creationId="{00000000-0000-0000-0000-000000000000}"/>
           </ac:spMkLst>
         </pc:spChg>
-        <pc:spChg chg="del mod topLvl">
-          <ac:chgData name="Andrew Baxter (student)" userId="b45e9002-b033-421d-a3d9-6d42475e9a3f" providerId="ADAL" clId="{C0C8088B-EF5A-4A28-AF3A-284F851ABD3A}" dt="2019-10-21T15:15:17.197" v="2" actId="478"/>
+        <pc:spChg chg="mod topLvl">
+          <ac:chgData name="Andrew Baxter (student)" userId="b45e9002-b033-421d-a3d9-6d42475e9a3f" providerId="ADAL" clId="{C0C8088B-EF5A-4A28-AF3A-284F851ABD3A}" dt="2019-10-23T15:24:30.216" v="0" actId="165"/>
           <ac:spMkLst>
             <pc:docMk/>
             <pc:sldMk cId="0" sldId="256"/>
             <ac:spMk id="4" creationId="{00000000-0000-0000-0000-000000000000}"/>
           </ac:spMkLst>
         </pc:spChg>
-        <pc:spChg chg="del mod topLvl">
-          <ac:chgData name="Andrew Baxter (student)" userId="b45e9002-b033-421d-a3d9-6d42475e9a3f" providerId="ADAL" clId="{C0C8088B-EF5A-4A28-AF3A-284F851ABD3A}" dt="2019-10-21T15:15:17.197" v="2" actId="478"/>
+        <pc:spChg chg="mod topLvl">
+          <ac:chgData name="Andrew Baxter (student)" userId="b45e9002-b033-421d-a3d9-6d42475e9a3f" providerId="ADAL" clId="{C0C8088B-EF5A-4A28-AF3A-284F851ABD3A}" dt="2019-10-23T15:24:30.216" v="0" actId="165"/>
           <ac:spMkLst>
             <pc:docMk/>
             <pc:sldMk cId="0" sldId="256"/>
             <ac:spMk id="5" creationId="{00000000-0000-0000-0000-000000000000}"/>
           </ac:spMkLst>
         </pc:spChg>
-        <pc:spChg chg="del mod topLvl">
-          <ac:chgData name="Andrew Baxter (student)" userId="b45e9002-b033-421d-a3d9-6d42475e9a3f" providerId="ADAL" clId="{C0C8088B-EF5A-4A28-AF3A-284F851ABD3A}" dt="2019-10-21T15:15:17.197" v="2" actId="478"/>
+        <pc:spChg chg="mod topLvl">
+          <ac:chgData name="Andrew Baxter (student)" userId="b45e9002-b033-421d-a3d9-6d42475e9a3f" providerId="ADAL" clId="{C0C8088B-EF5A-4A28-AF3A-284F851ABD3A}" dt="2019-10-23T15:24:30.216" v="0" actId="165"/>
           <ac:spMkLst>
             <pc:docMk/>
             <pc:sldMk cId="0" sldId="256"/>
             <ac:spMk id="6" creationId="{00000000-0000-0000-0000-000000000000}"/>
           </ac:spMkLst>
         </pc:spChg>
-        <pc:spChg chg="del mod topLvl">
-          <ac:chgData name="Andrew Baxter (student)" userId="b45e9002-b033-421d-a3d9-6d42475e9a3f" providerId="ADAL" clId="{C0C8088B-EF5A-4A28-AF3A-284F851ABD3A}" dt="2019-10-21T15:15:17.197" v="2" actId="478"/>
+        <pc:spChg chg="mod topLvl">
+          <ac:chgData name="Andrew Baxter (student)" userId="b45e9002-b033-421d-a3d9-6d42475e9a3f" providerId="ADAL" clId="{C0C8088B-EF5A-4A28-AF3A-284F851ABD3A}" dt="2019-10-23T15:24:30.216" v="0" actId="165"/>
           <ac:spMkLst>
             <pc:docMk/>
             <pc:sldMk cId="0" sldId="256"/>
             <ac:spMk id="7" creationId="{00000000-0000-0000-0000-000000000000}"/>
           </ac:spMkLst>
         </pc:spChg>
-        <pc:spChg chg="del mod topLvl">
-          <ac:chgData name="Andrew Baxter (student)" userId="b45e9002-b033-421d-a3d9-6d42475e9a3f" providerId="ADAL" clId="{C0C8088B-EF5A-4A28-AF3A-284F851ABD3A}" dt="2019-10-21T15:15:17.197" v="2" actId="478"/>
+        <pc:spChg chg="mod topLvl">
+          <ac:chgData name="Andrew Baxter (student)" userId="b45e9002-b033-421d-a3d9-6d42475e9a3f" providerId="ADAL" clId="{C0C8088B-EF5A-4A28-AF3A-284F851ABD3A}" dt="2019-10-23T15:24:30.216" v="0" actId="165"/>
           <ac:spMkLst>
             <pc:docMk/>
             <pc:sldMk cId="0" sldId="256"/>
             <ac:spMk id="8" creationId="{00000000-0000-0000-0000-000000000000}"/>
           </ac:spMkLst>
         </pc:spChg>
-        <pc:spChg chg="del mod topLvl">
-          <ac:chgData name="Andrew Baxter (student)" userId="b45e9002-b033-421d-a3d9-6d42475e9a3f" providerId="ADAL" clId="{C0C8088B-EF5A-4A28-AF3A-284F851ABD3A}" dt="2019-10-21T15:15:17.197" v="2" actId="478"/>
+        <pc:spChg chg="mod topLvl">
+          <ac:chgData name="Andrew Baxter (student)" userId="b45e9002-b033-421d-a3d9-6d42475e9a3f" providerId="ADAL" clId="{C0C8088B-EF5A-4A28-AF3A-284F851ABD3A}" dt="2019-10-23T15:24:30.216" v="0" actId="165"/>
           <ac:spMkLst>
             <pc:docMk/>
             <pc:sldMk cId="0" sldId="256"/>
             <ac:spMk id="9" creationId="{00000000-0000-0000-0000-000000000000}"/>
           </ac:spMkLst>
         </pc:spChg>
-        <pc:spChg chg="del mod topLvl">
-          <ac:chgData name="Andrew Baxter (student)" userId="b45e9002-b033-421d-a3d9-6d42475e9a3f" providerId="ADAL" clId="{C0C8088B-EF5A-4A28-AF3A-284F851ABD3A}" dt="2019-10-21T15:15:17.197" v="2" actId="478"/>
+        <pc:spChg chg="mod topLvl">
+          <ac:chgData name="Andrew Baxter (student)" userId="b45e9002-b033-421d-a3d9-6d42475e9a3f" providerId="ADAL" clId="{C0C8088B-EF5A-4A28-AF3A-284F851ABD3A}" dt="2019-10-23T15:24:30.216" v="0" actId="165"/>
           <ac:spMkLst>
             <pc:docMk/>
             <pc:sldMk cId="0" sldId="256"/>
             <ac:spMk id="10" creationId="{00000000-0000-0000-0000-000000000000}"/>
           </ac:spMkLst>
         </pc:spChg>
-        <pc:spChg chg="del mod topLvl">
-          <ac:chgData name="Andrew Baxter (student)" userId="b45e9002-b033-421d-a3d9-6d42475e9a3f" providerId="ADAL" clId="{C0C8088B-EF5A-4A28-AF3A-284F851ABD3A}" dt="2019-10-21T15:15:17.197" v="2" actId="478"/>
+        <pc:spChg chg="mod topLvl">
+          <ac:chgData name="Andrew Baxter (student)" userId="b45e9002-b033-421d-a3d9-6d42475e9a3f" providerId="ADAL" clId="{C0C8088B-EF5A-4A28-AF3A-284F851ABD3A}" dt="2019-10-23T15:24:30.216" v="0" actId="165"/>
           <ac:spMkLst>
             <pc:docMk/>
             <pc:sldMk cId="0" sldId="256"/>
@@ -219,7 +219,7 @@
           </ac:spMkLst>
         </pc:spChg>
         <pc:spChg chg="mod topLvl">
-          <ac:chgData name="Andrew Baxter (student)" userId="b45e9002-b033-421d-a3d9-6d42475e9a3f" providerId="ADAL" clId="{C0C8088B-EF5A-4A28-AF3A-284F851ABD3A}" dt="2019-10-21T15:15:24.973" v="3" actId="164"/>
+          <ac:chgData name="Andrew Baxter (student)" userId="b45e9002-b033-421d-a3d9-6d42475e9a3f" providerId="ADAL" clId="{C0C8088B-EF5A-4A28-AF3A-284F851ABD3A}" dt="2019-10-23T15:24:35.997" v="2" actId="164"/>
           <ac:spMkLst>
             <pc:docMk/>
             <pc:sldMk cId="0" sldId="256"/>
@@ -227,7 +227,7 @@
           </ac:spMkLst>
         </pc:spChg>
         <pc:spChg chg="mod topLvl">
-          <ac:chgData name="Andrew Baxter (student)" userId="b45e9002-b033-421d-a3d9-6d42475e9a3f" providerId="ADAL" clId="{C0C8088B-EF5A-4A28-AF3A-284F851ABD3A}" dt="2019-10-21T15:15:24.973" v="3" actId="164"/>
+          <ac:chgData name="Andrew Baxter (student)" userId="b45e9002-b033-421d-a3d9-6d42475e9a3f" providerId="ADAL" clId="{C0C8088B-EF5A-4A28-AF3A-284F851ABD3A}" dt="2019-10-23T15:24:35.997" v="2" actId="164"/>
           <ac:spMkLst>
             <pc:docMk/>
             <pc:sldMk cId="0" sldId="256"/>
@@ -235,7 +235,7 @@
           </ac:spMkLst>
         </pc:spChg>
         <pc:spChg chg="mod topLvl">
-          <ac:chgData name="Andrew Baxter (student)" userId="b45e9002-b033-421d-a3d9-6d42475e9a3f" providerId="ADAL" clId="{C0C8088B-EF5A-4A28-AF3A-284F851ABD3A}" dt="2019-10-21T15:15:24.973" v="3" actId="164"/>
+          <ac:chgData name="Andrew Baxter (student)" userId="b45e9002-b033-421d-a3d9-6d42475e9a3f" providerId="ADAL" clId="{C0C8088B-EF5A-4A28-AF3A-284F851ABD3A}" dt="2019-10-23T15:24:35.997" v="2" actId="164"/>
           <ac:spMkLst>
             <pc:docMk/>
             <pc:sldMk cId="0" sldId="256"/>
@@ -243,7 +243,7 @@
           </ac:spMkLst>
         </pc:spChg>
         <pc:spChg chg="mod topLvl">
-          <ac:chgData name="Andrew Baxter (student)" userId="b45e9002-b033-421d-a3d9-6d42475e9a3f" providerId="ADAL" clId="{C0C8088B-EF5A-4A28-AF3A-284F851ABD3A}" dt="2019-10-21T15:15:24.973" v="3" actId="164"/>
+          <ac:chgData name="Andrew Baxter (student)" userId="b45e9002-b033-421d-a3d9-6d42475e9a3f" providerId="ADAL" clId="{C0C8088B-EF5A-4A28-AF3A-284F851ABD3A}" dt="2019-10-23T15:24:35.997" v="2" actId="164"/>
           <ac:spMkLst>
             <pc:docMk/>
             <pc:sldMk cId="0" sldId="256"/>
@@ -251,7 +251,7 @@
           </ac:spMkLst>
         </pc:spChg>
         <pc:spChg chg="mod topLvl">
-          <ac:chgData name="Andrew Baxter (student)" userId="b45e9002-b033-421d-a3d9-6d42475e9a3f" providerId="ADAL" clId="{C0C8088B-EF5A-4A28-AF3A-284F851ABD3A}" dt="2019-10-21T15:15:24.973" v="3" actId="164"/>
+          <ac:chgData name="Andrew Baxter (student)" userId="b45e9002-b033-421d-a3d9-6d42475e9a3f" providerId="ADAL" clId="{C0C8088B-EF5A-4A28-AF3A-284F851ABD3A}" dt="2019-10-23T15:24:35.997" v="2" actId="164"/>
           <ac:spMkLst>
             <pc:docMk/>
             <pc:sldMk cId="0" sldId="256"/>
@@ -259,7 +259,7 @@
           </ac:spMkLst>
         </pc:spChg>
         <pc:spChg chg="mod topLvl">
-          <ac:chgData name="Andrew Baxter (student)" userId="b45e9002-b033-421d-a3d9-6d42475e9a3f" providerId="ADAL" clId="{C0C8088B-EF5A-4A28-AF3A-284F851ABD3A}" dt="2019-10-21T15:15:24.973" v="3" actId="164"/>
+          <ac:chgData name="Andrew Baxter (student)" userId="b45e9002-b033-421d-a3d9-6d42475e9a3f" providerId="ADAL" clId="{C0C8088B-EF5A-4A28-AF3A-284F851ABD3A}" dt="2019-10-23T15:24:35.997" v="2" actId="164"/>
           <ac:spMkLst>
             <pc:docMk/>
             <pc:sldMk cId="0" sldId="256"/>
@@ -267,7 +267,7 @@
           </ac:spMkLst>
         </pc:spChg>
         <pc:spChg chg="mod topLvl">
-          <ac:chgData name="Andrew Baxter (student)" userId="b45e9002-b033-421d-a3d9-6d42475e9a3f" providerId="ADAL" clId="{C0C8088B-EF5A-4A28-AF3A-284F851ABD3A}" dt="2019-10-21T15:15:24.973" v="3" actId="164"/>
+          <ac:chgData name="Andrew Baxter (student)" userId="b45e9002-b033-421d-a3d9-6d42475e9a3f" providerId="ADAL" clId="{C0C8088B-EF5A-4A28-AF3A-284F851ABD3A}" dt="2019-10-23T15:24:35.997" v="2" actId="164"/>
           <ac:spMkLst>
             <pc:docMk/>
             <pc:sldMk cId="0" sldId="256"/>
@@ -275,7 +275,7 @@
           </ac:spMkLst>
         </pc:spChg>
         <pc:spChg chg="mod topLvl">
-          <ac:chgData name="Andrew Baxter (student)" userId="b45e9002-b033-421d-a3d9-6d42475e9a3f" providerId="ADAL" clId="{C0C8088B-EF5A-4A28-AF3A-284F851ABD3A}" dt="2019-10-21T15:15:24.973" v="3" actId="164"/>
+          <ac:chgData name="Andrew Baxter (student)" userId="b45e9002-b033-421d-a3d9-6d42475e9a3f" providerId="ADAL" clId="{C0C8088B-EF5A-4A28-AF3A-284F851ABD3A}" dt="2019-10-23T15:24:35.997" v="2" actId="164"/>
           <ac:spMkLst>
             <pc:docMk/>
             <pc:sldMk cId="0" sldId="256"/>
@@ -283,7 +283,7 @@
           </ac:spMkLst>
         </pc:spChg>
         <pc:spChg chg="mod topLvl">
-          <ac:chgData name="Andrew Baxter (student)" userId="b45e9002-b033-421d-a3d9-6d42475e9a3f" providerId="ADAL" clId="{C0C8088B-EF5A-4A28-AF3A-284F851ABD3A}" dt="2019-10-21T15:15:24.973" v="3" actId="164"/>
+          <ac:chgData name="Andrew Baxter (student)" userId="b45e9002-b033-421d-a3d9-6d42475e9a3f" providerId="ADAL" clId="{C0C8088B-EF5A-4A28-AF3A-284F851ABD3A}" dt="2019-10-23T15:24:35.997" v="2" actId="164"/>
           <ac:spMkLst>
             <pc:docMk/>
             <pc:sldMk cId="0" sldId="256"/>
@@ -291,7 +291,7 @@
           </ac:spMkLst>
         </pc:spChg>
         <pc:spChg chg="mod topLvl">
-          <ac:chgData name="Andrew Baxter (student)" userId="b45e9002-b033-421d-a3d9-6d42475e9a3f" providerId="ADAL" clId="{C0C8088B-EF5A-4A28-AF3A-284F851ABD3A}" dt="2019-10-21T15:15:24.973" v="3" actId="164"/>
+          <ac:chgData name="Andrew Baxter (student)" userId="b45e9002-b033-421d-a3d9-6d42475e9a3f" providerId="ADAL" clId="{C0C8088B-EF5A-4A28-AF3A-284F851ABD3A}" dt="2019-10-23T15:24:35.997" v="2" actId="164"/>
           <ac:spMkLst>
             <pc:docMk/>
             <pc:sldMk cId="0" sldId="256"/>
@@ -299,7 +299,7 @@
           </ac:spMkLst>
         </pc:spChg>
         <pc:spChg chg="mod topLvl">
-          <ac:chgData name="Andrew Baxter (student)" userId="b45e9002-b033-421d-a3d9-6d42475e9a3f" providerId="ADAL" clId="{C0C8088B-EF5A-4A28-AF3A-284F851ABD3A}" dt="2019-10-21T15:15:24.973" v="3" actId="164"/>
+          <ac:chgData name="Andrew Baxter (student)" userId="b45e9002-b033-421d-a3d9-6d42475e9a3f" providerId="ADAL" clId="{C0C8088B-EF5A-4A28-AF3A-284F851ABD3A}" dt="2019-10-23T15:24:35.997" v="2" actId="164"/>
           <ac:spMkLst>
             <pc:docMk/>
             <pc:sldMk cId="0" sldId="256"/>
@@ -307,7 +307,7 @@
           </ac:spMkLst>
         </pc:spChg>
         <pc:spChg chg="mod topLvl">
-          <ac:chgData name="Andrew Baxter (student)" userId="b45e9002-b033-421d-a3d9-6d42475e9a3f" providerId="ADAL" clId="{C0C8088B-EF5A-4A28-AF3A-284F851ABD3A}" dt="2019-10-21T15:15:24.973" v="3" actId="164"/>
+          <ac:chgData name="Andrew Baxter (student)" userId="b45e9002-b033-421d-a3d9-6d42475e9a3f" providerId="ADAL" clId="{C0C8088B-EF5A-4A28-AF3A-284F851ABD3A}" dt="2019-10-23T15:24:35.997" v="2" actId="164"/>
           <ac:spMkLst>
             <pc:docMk/>
             <pc:sldMk cId="0" sldId="256"/>
@@ -315,7 +315,7 @@
           </ac:spMkLst>
         </pc:spChg>
         <pc:spChg chg="mod topLvl">
-          <ac:chgData name="Andrew Baxter (student)" userId="b45e9002-b033-421d-a3d9-6d42475e9a3f" providerId="ADAL" clId="{C0C8088B-EF5A-4A28-AF3A-284F851ABD3A}" dt="2019-10-21T15:15:24.973" v="3" actId="164"/>
+          <ac:chgData name="Andrew Baxter (student)" userId="b45e9002-b033-421d-a3d9-6d42475e9a3f" providerId="ADAL" clId="{C0C8088B-EF5A-4A28-AF3A-284F851ABD3A}" dt="2019-10-23T15:24:35.997" v="2" actId="164"/>
           <ac:spMkLst>
             <pc:docMk/>
             <pc:sldMk cId="0" sldId="256"/>
@@ -323,7 +323,7 @@
           </ac:spMkLst>
         </pc:spChg>
         <pc:spChg chg="mod topLvl">
-          <ac:chgData name="Andrew Baxter (student)" userId="b45e9002-b033-421d-a3d9-6d42475e9a3f" providerId="ADAL" clId="{C0C8088B-EF5A-4A28-AF3A-284F851ABD3A}" dt="2019-10-21T15:15:24.973" v="3" actId="164"/>
+          <ac:chgData name="Andrew Baxter (student)" userId="b45e9002-b033-421d-a3d9-6d42475e9a3f" providerId="ADAL" clId="{C0C8088B-EF5A-4A28-AF3A-284F851ABD3A}" dt="2019-10-23T15:24:35.997" v="2" actId="164"/>
           <ac:spMkLst>
             <pc:docMk/>
             <pc:sldMk cId="0" sldId="256"/>
@@ -331,7 +331,7 @@
           </ac:spMkLst>
         </pc:spChg>
         <pc:spChg chg="mod topLvl">
-          <ac:chgData name="Andrew Baxter (student)" userId="b45e9002-b033-421d-a3d9-6d42475e9a3f" providerId="ADAL" clId="{C0C8088B-EF5A-4A28-AF3A-284F851ABD3A}" dt="2019-10-21T15:15:24.973" v="3" actId="164"/>
+          <ac:chgData name="Andrew Baxter (student)" userId="b45e9002-b033-421d-a3d9-6d42475e9a3f" providerId="ADAL" clId="{C0C8088B-EF5A-4A28-AF3A-284F851ABD3A}" dt="2019-10-23T15:24:35.997" v="2" actId="164"/>
           <ac:spMkLst>
             <pc:docMk/>
             <pc:sldMk cId="0" sldId="256"/>
@@ -339,7 +339,7 @@
           </ac:spMkLst>
         </pc:spChg>
         <pc:spChg chg="mod topLvl">
-          <ac:chgData name="Andrew Baxter (student)" userId="b45e9002-b033-421d-a3d9-6d42475e9a3f" providerId="ADAL" clId="{C0C8088B-EF5A-4A28-AF3A-284F851ABD3A}" dt="2019-10-21T15:15:24.973" v="3" actId="164"/>
+          <ac:chgData name="Andrew Baxter (student)" userId="b45e9002-b033-421d-a3d9-6d42475e9a3f" providerId="ADAL" clId="{C0C8088B-EF5A-4A28-AF3A-284F851ABD3A}" dt="2019-10-23T15:24:35.997" v="2" actId="164"/>
           <ac:spMkLst>
             <pc:docMk/>
             <pc:sldMk cId="0" sldId="256"/>
@@ -347,7 +347,7 @@
           </ac:spMkLst>
         </pc:spChg>
         <pc:spChg chg="mod topLvl">
-          <ac:chgData name="Andrew Baxter (student)" userId="b45e9002-b033-421d-a3d9-6d42475e9a3f" providerId="ADAL" clId="{C0C8088B-EF5A-4A28-AF3A-284F851ABD3A}" dt="2019-10-21T15:15:24.973" v="3" actId="164"/>
+          <ac:chgData name="Andrew Baxter (student)" userId="b45e9002-b033-421d-a3d9-6d42475e9a3f" providerId="ADAL" clId="{C0C8088B-EF5A-4A28-AF3A-284F851ABD3A}" dt="2019-10-23T15:24:35.997" v="2" actId="164"/>
           <ac:spMkLst>
             <pc:docMk/>
             <pc:sldMk cId="0" sldId="256"/>
@@ -355,7 +355,7 @@
           </ac:spMkLst>
         </pc:spChg>
         <pc:spChg chg="mod topLvl">
-          <ac:chgData name="Andrew Baxter (student)" userId="b45e9002-b033-421d-a3d9-6d42475e9a3f" providerId="ADAL" clId="{C0C8088B-EF5A-4A28-AF3A-284F851ABD3A}" dt="2019-10-21T15:15:24.973" v="3" actId="164"/>
+          <ac:chgData name="Andrew Baxter (student)" userId="b45e9002-b033-421d-a3d9-6d42475e9a3f" providerId="ADAL" clId="{C0C8088B-EF5A-4A28-AF3A-284F851ABD3A}" dt="2019-10-23T15:24:35.997" v="2" actId="164"/>
           <ac:spMkLst>
             <pc:docMk/>
             <pc:sldMk cId="0" sldId="256"/>
@@ -363,7 +363,7 @@
           </ac:spMkLst>
         </pc:spChg>
         <pc:spChg chg="mod topLvl">
-          <ac:chgData name="Andrew Baxter (student)" userId="b45e9002-b033-421d-a3d9-6d42475e9a3f" providerId="ADAL" clId="{C0C8088B-EF5A-4A28-AF3A-284F851ABD3A}" dt="2019-10-21T15:15:24.973" v="3" actId="164"/>
+          <ac:chgData name="Andrew Baxter (student)" userId="b45e9002-b033-421d-a3d9-6d42475e9a3f" providerId="ADAL" clId="{C0C8088B-EF5A-4A28-AF3A-284F851ABD3A}" dt="2019-10-23T15:24:35.997" v="2" actId="164"/>
           <ac:spMkLst>
             <pc:docMk/>
             <pc:sldMk cId="0" sldId="256"/>
@@ -371,7 +371,7 @@
           </ac:spMkLst>
         </pc:spChg>
         <pc:grpChg chg="del">
-          <ac:chgData name="Andrew Baxter (student)" userId="b45e9002-b033-421d-a3d9-6d42475e9a3f" providerId="ADAL" clId="{C0C8088B-EF5A-4A28-AF3A-284F851ABD3A}" dt="2019-10-21T15:15:11.879" v="0" actId="165"/>
+          <ac:chgData name="Andrew Baxter (student)" userId="b45e9002-b033-421d-a3d9-6d42475e9a3f" providerId="ADAL" clId="{C0C8088B-EF5A-4A28-AF3A-284F851ABD3A}" dt="2019-10-23T15:24:30.216" v="0" actId="165"/>
           <ac:grpSpMkLst>
             <pc:docMk/>
             <pc:sldMk cId="0" sldId="256"/>
@@ -379,11 +379,11 @@
           </ac:grpSpMkLst>
         </pc:grpChg>
         <pc:grpChg chg="add mod">
-          <ac:chgData name="Andrew Baxter (student)" userId="b45e9002-b033-421d-a3d9-6d42475e9a3f" providerId="ADAL" clId="{C0C8088B-EF5A-4A28-AF3A-284F851ABD3A}" dt="2019-10-21T15:15:24.973" v="3" actId="164"/>
+          <ac:chgData name="Andrew Baxter (student)" userId="b45e9002-b033-421d-a3d9-6d42475e9a3f" providerId="ADAL" clId="{C0C8088B-EF5A-4A28-AF3A-284F851ABD3A}" dt="2019-10-23T15:24:35.997" v="2" actId="164"/>
           <ac:grpSpMkLst>
             <pc:docMk/>
             <pc:sldMk cId="0" sldId="256"/>
-            <ac:grpSpMk id="31" creationId="{83C3BC46-2A44-4368-89E8-8DC6EB432625}"/>
+            <ac:grpSpMk id="31" creationId="{6E7D8251-BF9B-49A0-BDBB-3704DCC96EC0}"/>
           </ac:grpSpMkLst>
         </pc:grpChg>
       </pc:sldChg>
@@ -573,7 +573,7 @@
           <a:p>
             <a:fld id="{6BA5D40C-A8DC-479A-A5D3-E7B4936A184B}" type="datetimeFigureOut">
               <a:rPr lang="en-GB" smtClean="0"/>
-              <a:t>21/10/2019</a:t>
+              <a:t>23/10/2019</a:t>
             </a:fld>
             <a:endParaRPr lang="en-GB"/>
           </a:p>
@@ -743,7 +743,7 @@
           <a:p>
             <a:fld id="{6BA5D40C-A8DC-479A-A5D3-E7B4936A184B}" type="datetimeFigureOut">
               <a:rPr lang="en-GB" smtClean="0"/>
-              <a:t>21/10/2019</a:t>
+              <a:t>23/10/2019</a:t>
             </a:fld>
             <a:endParaRPr lang="en-GB"/>
           </a:p>
@@ -923,7 +923,7 @@
           <a:p>
             <a:fld id="{6BA5D40C-A8DC-479A-A5D3-E7B4936A184B}" type="datetimeFigureOut">
               <a:rPr lang="en-GB" smtClean="0"/>
-              <a:t>21/10/2019</a:t>
+              <a:t>23/10/2019</a:t>
             </a:fld>
             <a:endParaRPr lang="en-GB"/>
           </a:p>
@@ -1093,7 +1093,7 @@
           <a:p>
             <a:fld id="{6BA5D40C-A8DC-479A-A5D3-E7B4936A184B}" type="datetimeFigureOut">
               <a:rPr lang="en-GB" smtClean="0"/>
-              <a:t>21/10/2019</a:t>
+              <a:t>23/10/2019</a:t>
             </a:fld>
             <a:endParaRPr lang="en-GB"/>
           </a:p>
@@ -1339,7 +1339,7 @@
           <a:p>
             <a:fld id="{6BA5D40C-A8DC-479A-A5D3-E7B4936A184B}" type="datetimeFigureOut">
               <a:rPr lang="en-GB" smtClean="0"/>
-              <a:t>21/10/2019</a:t>
+              <a:t>23/10/2019</a:t>
             </a:fld>
             <a:endParaRPr lang="en-GB"/>
           </a:p>
@@ -1627,7 +1627,7 @@
           <a:p>
             <a:fld id="{6BA5D40C-A8DC-479A-A5D3-E7B4936A184B}" type="datetimeFigureOut">
               <a:rPr lang="en-GB" smtClean="0"/>
-              <a:t>21/10/2019</a:t>
+              <a:t>23/10/2019</a:t>
             </a:fld>
             <a:endParaRPr lang="en-GB"/>
           </a:p>
@@ -2054,7 +2054,7 @@
           <a:p>
             <a:fld id="{6BA5D40C-A8DC-479A-A5D3-E7B4936A184B}" type="datetimeFigureOut">
               <a:rPr lang="en-GB" smtClean="0"/>
-              <a:t>21/10/2019</a:t>
+              <a:t>23/10/2019</a:t>
             </a:fld>
             <a:endParaRPr lang="en-GB"/>
           </a:p>
@@ -2172,7 +2172,7 @@
           <a:p>
             <a:fld id="{6BA5D40C-A8DC-479A-A5D3-E7B4936A184B}" type="datetimeFigureOut">
               <a:rPr lang="en-GB" smtClean="0"/>
-              <a:t>21/10/2019</a:t>
+              <a:t>23/10/2019</a:t>
             </a:fld>
             <a:endParaRPr lang="en-GB"/>
           </a:p>
@@ -2267,7 +2267,7 @@
           <a:p>
             <a:fld id="{6BA5D40C-A8DC-479A-A5D3-E7B4936A184B}" type="datetimeFigureOut">
               <a:rPr lang="en-GB" smtClean="0"/>
-              <a:t>21/10/2019</a:t>
+              <a:t>23/10/2019</a:t>
             </a:fld>
             <a:endParaRPr lang="en-GB"/>
           </a:p>
@@ -2544,7 +2544,7 @@
           <a:p>
             <a:fld id="{6BA5D40C-A8DC-479A-A5D3-E7B4936A184B}" type="datetimeFigureOut">
               <a:rPr lang="en-GB" smtClean="0"/>
-              <a:t>21/10/2019</a:t>
+              <a:t>23/10/2019</a:t>
             </a:fld>
             <a:endParaRPr lang="en-GB"/>
           </a:p>
@@ -2797,7 +2797,7 @@
           <a:p>
             <a:fld id="{6BA5D40C-A8DC-479A-A5D3-E7B4936A184B}" type="datetimeFigureOut">
               <a:rPr lang="en-GB" smtClean="0"/>
-              <a:t>21/10/2019</a:t>
+              <a:t>23/10/2019</a:t>
             </a:fld>
             <a:endParaRPr lang="en-GB"/>
           </a:p>
@@ -3010,7 +3010,7 @@
           <a:p>
             <a:fld id="{6BA5D40C-A8DC-479A-A5D3-E7B4936A184B}" type="datetimeFigureOut">
               <a:rPr lang="en-GB" smtClean="0"/>
-              <a:t>21/10/2019</a:t>
+              <a:t>23/10/2019</a:t>
             </a:fld>
             <a:endParaRPr lang="en-GB"/>
           </a:p>
@@ -3385,12 +3385,308 @@
           <a:chExt cx="0" cy="0"/>
         </a:xfrm>
       </p:grpSpPr>
+      <p:sp>
+        <p:nvSpPr>
+          <p:cNvPr id="4" name="pt4"/>
+          <p:cNvSpPr/>
+          <p:nvPr/>
+        </p:nvSpPr>
+        <p:spPr>
+          <a:xfrm>
+            <a:off x="2407896" y="2640586"/>
+            <a:ext cx="49651" cy="49651"/>
+          </a:xfrm>
+          <a:prstGeom prst="ellipse">
+            <a:avLst/>
+          </a:prstGeom>
+          <a:solidFill>
+            <a:srgbClr val="00A84C">
+              <a:alpha val="100000"/>
+            </a:srgbClr>
+          </a:solidFill>
+          <a:ln w="9000" cap="rnd">
+            <a:solidFill>
+              <a:srgbClr val="00A84C">
+                <a:alpha val="100000"/>
+              </a:srgbClr>
+            </a:solidFill>
+            <a:prstDash val="solid"/>
+            <a:round/>
+          </a:ln>
+        </p:spPr>
+        <p:txBody>
+          <a:bodyPr/>
+          <a:lstStyle/>
+          <a:p>
+            <a:endParaRPr/>
+          </a:p>
+        </p:txBody>
+      </p:sp>
+      <p:sp>
+        <p:nvSpPr>
+          <p:cNvPr id="5" name="pt5"/>
+          <p:cNvSpPr/>
+          <p:nvPr/>
+        </p:nvSpPr>
+        <p:spPr>
+          <a:xfrm>
+            <a:off x="2636560" y="2640586"/>
+            <a:ext cx="49651" cy="49651"/>
+          </a:xfrm>
+          <a:prstGeom prst="ellipse">
+            <a:avLst/>
+          </a:prstGeom>
+          <a:solidFill>
+            <a:srgbClr val="00FFFF">
+              <a:alpha val="100000"/>
+            </a:srgbClr>
+          </a:solidFill>
+          <a:ln w="9000" cap="rnd">
+            <a:solidFill>
+              <a:srgbClr val="00FFFF">
+                <a:alpha val="100000"/>
+              </a:srgbClr>
+            </a:solidFill>
+            <a:prstDash val="solid"/>
+            <a:round/>
+          </a:ln>
+        </p:spPr>
+        <p:txBody>
+          <a:bodyPr/>
+          <a:lstStyle/>
+          <a:p>
+            <a:endParaRPr/>
+          </a:p>
+        </p:txBody>
+      </p:sp>
+      <p:sp>
+        <p:nvSpPr>
+          <p:cNvPr id="6" name="pt6"/>
+          <p:cNvSpPr/>
+          <p:nvPr/>
+        </p:nvSpPr>
+        <p:spPr>
+          <a:xfrm>
+            <a:off x="2865223" y="2640586"/>
+            <a:ext cx="49651" cy="49651"/>
+          </a:xfrm>
+          <a:prstGeom prst="ellipse">
+            <a:avLst/>
+          </a:prstGeom>
+          <a:solidFill>
+            <a:srgbClr val="7F00FF">
+              <a:alpha val="100000"/>
+            </a:srgbClr>
+          </a:solidFill>
+          <a:ln w="9000" cap="rnd">
+            <a:solidFill>
+              <a:srgbClr val="7F00FF">
+                <a:alpha val="100000"/>
+              </a:srgbClr>
+            </a:solidFill>
+            <a:prstDash val="solid"/>
+            <a:round/>
+          </a:ln>
+        </p:spPr>
+        <p:txBody>
+          <a:bodyPr/>
+          <a:lstStyle/>
+          <a:p>
+            <a:endParaRPr/>
+          </a:p>
+        </p:txBody>
+      </p:sp>
+      <p:sp>
+        <p:nvSpPr>
+          <p:cNvPr id="7" name="pt7"/>
+          <p:cNvSpPr/>
+          <p:nvPr/>
+        </p:nvSpPr>
+        <p:spPr>
+          <a:xfrm>
+            <a:off x="3093886" y="2640586"/>
+            <a:ext cx="49651" cy="49651"/>
+          </a:xfrm>
+          <a:prstGeom prst="ellipse">
+            <a:avLst/>
+          </a:prstGeom>
+          <a:solidFill>
+            <a:srgbClr val="DC9DBE">
+              <a:alpha val="100000"/>
+            </a:srgbClr>
+          </a:solidFill>
+          <a:ln w="9000" cap="rnd">
+            <a:solidFill>
+              <a:srgbClr val="DC9DBE">
+                <a:alpha val="100000"/>
+              </a:srgbClr>
+            </a:solidFill>
+            <a:prstDash val="solid"/>
+            <a:round/>
+          </a:ln>
+        </p:spPr>
+        <p:txBody>
+          <a:bodyPr/>
+          <a:lstStyle/>
+          <a:p>
+            <a:endParaRPr/>
+          </a:p>
+        </p:txBody>
+      </p:sp>
+      <p:sp>
+        <p:nvSpPr>
+          <p:cNvPr id="8" name="pt8"/>
+          <p:cNvSpPr/>
+          <p:nvPr/>
+        </p:nvSpPr>
+        <p:spPr>
+          <a:xfrm>
+            <a:off x="3322549" y="2640586"/>
+            <a:ext cx="49651" cy="49651"/>
+          </a:xfrm>
+          <a:prstGeom prst="ellipse">
+            <a:avLst/>
+          </a:prstGeom>
+          <a:solidFill>
+            <a:srgbClr val="9D5524">
+              <a:alpha val="100000"/>
+            </a:srgbClr>
+          </a:solidFill>
+          <a:ln w="9000" cap="rnd">
+            <a:solidFill>
+              <a:srgbClr val="9D5524">
+                <a:alpha val="100000"/>
+              </a:srgbClr>
+            </a:solidFill>
+            <a:prstDash val="solid"/>
+            <a:round/>
+          </a:ln>
+        </p:spPr>
+        <p:txBody>
+          <a:bodyPr/>
+          <a:lstStyle/>
+          <a:p>
+            <a:endParaRPr/>
+          </a:p>
+        </p:txBody>
+      </p:sp>
+      <p:sp>
+        <p:nvSpPr>
+          <p:cNvPr id="9" name="pt9"/>
+          <p:cNvSpPr/>
+          <p:nvPr/>
+        </p:nvSpPr>
+        <p:spPr>
+          <a:xfrm>
+            <a:off x="3551212" y="2640586"/>
+            <a:ext cx="49651" cy="49651"/>
+          </a:xfrm>
+          <a:prstGeom prst="ellipse">
+            <a:avLst/>
+          </a:prstGeom>
+          <a:solidFill>
+            <a:srgbClr val="FF0000">
+              <a:alpha val="100000"/>
+            </a:srgbClr>
+          </a:solidFill>
+          <a:ln w="9000" cap="rnd">
+            <a:solidFill>
+              <a:srgbClr val="FF0000">
+                <a:alpha val="100000"/>
+              </a:srgbClr>
+            </a:solidFill>
+            <a:prstDash val="solid"/>
+            <a:round/>
+          </a:ln>
+        </p:spPr>
+        <p:txBody>
+          <a:bodyPr/>
+          <a:lstStyle/>
+          <a:p>
+            <a:endParaRPr/>
+          </a:p>
+        </p:txBody>
+      </p:sp>
+      <p:sp>
+        <p:nvSpPr>
+          <p:cNvPr id="10" name="pt10"/>
+          <p:cNvSpPr/>
+          <p:nvPr/>
+        </p:nvSpPr>
+        <p:spPr>
+          <a:xfrm>
+            <a:off x="3779875" y="2640586"/>
+            <a:ext cx="49651" cy="49651"/>
+          </a:xfrm>
+          <a:prstGeom prst="ellipse">
+            <a:avLst/>
+          </a:prstGeom>
+          <a:solidFill>
+            <a:srgbClr val="7FFF00">
+              <a:alpha val="100000"/>
+            </a:srgbClr>
+          </a:solidFill>
+          <a:ln w="9000" cap="rnd">
+            <a:solidFill>
+              <a:srgbClr val="7FFF00">
+                <a:alpha val="100000"/>
+              </a:srgbClr>
+            </a:solidFill>
+            <a:prstDash val="solid"/>
+            <a:round/>
+          </a:ln>
+        </p:spPr>
+        <p:txBody>
+          <a:bodyPr/>
+          <a:lstStyle/>
+          <a:p>
+            <a:endParaRPr/>
+          </a:p>
+        </p:txBody>
+      </p:sp>
+      <p:sp>
+        <p:nvSpPr>
+          <p:cNvPr id="11" name="pt11"/>
+          <p:cNvSpPr/>
+          <p:nvPr/>
+        </p:nvSpPr>
+        <p:spPr>
+          <a:xfrm>
+            <a:off x="4008538" y="2640586"/>
+            <a:ext cx="49651" cy="49651"/>
+          </a:xfrm>
+          <a:prstGeom prst="ellipse">
+            <a:avLst/>
+          </a:prstGeom>
+          <a:solidFill>
+            <a:srgbClr val="FE9D00">
+              <a:alpha val="100000"/>
+            </a:srgbClr>
+          </a:solidFill>
+          <a:ln w="9000" cap="rnd">
+            <a:solidFill>
+              <a:srgbClr val="FE9D00">
+                <a:alpha val="100000"/>
+              </a:srgbClr>
+            </a:solidFill>
+            <a:prstDash val="solid"/>
+            <a:round/>
+          </a:ln>
+        </p:spPr>
+        <p:txBody>
+          <a:bodyPr/>
+          <a:lstStyle/>
+          <a:p>
+            <a:endParaRPr/>
+          </a:p>
+        </p:txBody>
+      </p:sp>
       <p:grpSp>
         <p:nvGrpSpPr>
           <p:cNvPr id="31" name="Group 30">
             <a:extLst>
               <a:ext uri="{FF2B5EF4-FFF2-40B4-BE49-F238E27FC236}">
-                <a16:creationId xmlns:a16="http://schemas.microsoft.com/office/drawing/2014/main" id="{83C3BC46-2A44-4368-89E8-8DC6EB432625}"/>
+                <a16:creationId xmlns:a16="http://schemas.microsoft.com/office/drawing/2014/main" id="{6E7D8251-BF9B-49A0-BDBB-3704DCC96EC0}"/>
               </a:ext>
             </a:extLst>
           </p:cNvPr>
@@ -3399,9 +3695,9 @@
         </p:nvGrpSpPr>
         <p:grpSpPr>
           <a:xfrm>
-            <a:off x="4714050" y="1548575"/>
+            <a:off x="4242562" y="1548575"/>
             <a:ext cx="1024762" cy="2207556"/>
-            <a:chOff x="4714050" y="1548575"/>
+            <a:chOff x="4242562" y="1548575"/>
             <a:chExt cx="1024762" cy="2207556"/>
           </a:xfrm>
         </p:grpSpPr>
@@ -3413,7 +3709,7 @@
           </p:nvSpPr>
           <p:spPr>
             <a:xfrm>
-              <a:off x="4714050" y="1548575"/>
+              <a:off x="4242562" y="1548575"/>
               <a:ext cx="1024762" cy="103342"/>
             </a:xfrm>
             <a:prstGeom prst="rect">
@@ -3459,7 +3755,7 @@
           </p:nvSpPr>
           <p:spPr>
             <a:xfrm>
-              <a:off x="4714050" y="1701156"/>
+              <a:off x="4242562" y="1701156"/>
               <a:ext cx="745362" cy="101637"/>
             </a:xfrm>
             <a:prstGeom prst="rect">
@@ -3505,7 +3801,7 @@
           </p:nvSpPr>
           <p:spPr>
             <a:xfrm>
-              <a:off x="4714050" y="1822564"/>
+              <a:off x="4242562" y="1822564"/>
               <a:ext cx="877490" cy="131105"/>
             </a:xfrm>
             <a:prstGeom prst="rect">
@@ -3551,7 +3847,7 @@
           </p:nvSpPr>
           <p:spPr>
             <a:xfrm>
-              <a:off x="4751525" y="2075433"/>
+              <a:off x="4280037" y="2075433"/>
               <a:ext cx="144506" cy="144506"/>
             </a:xfrm>
             <a:prstGeom prst="ellipse">
@@ -3588,7 +3884,7 @@
           </p:nvSpPr>
           <p:spPr>
             <a:xfrm>
-              <a:off x="4751525" y="2294889"/>
+              <a:off x="4280037" y="2294889"/>
               <a:ext cx="144506" cy="144506"/>
             </a:xfrm>
             <a:prstGeom prst="ellipse">
@@ -3625,7 +3921,7 @@
           </p:nvSpPr>
           <p:spPr>
             <a:xfrm>
-              <a:off x="4751525" y="2514345"/>
+              <a:off x="4280037" y="2514345"/>
               <a:ext cx="144506" cy="144506"/>
             </a:xfrm>
             <a:prstGeom prst="ellipse">
@@ -3662,7 +3958,7 @@
           </p:nvSpPr>
           <p:spPr>
             <a:xfrm>
-              <a:off x="4751525" y="2733801"/>
+              <a:off x="4280037" y="2733801"/>
               <a:ext cx="144506" cy="144506"/>
             </a:xfrm>
             <a:prstGeom prst="ellipse">
@@ -3699,7 +3995,7 @@
           </p:nvSpPr>
           <p:spPr>
             <a:xfrm>
-              <a:off x="4751525" y="2953257"/>
+              <a:off x="4280037" y="2953257"/>
               <a:ext cx="144506" cy="144506"/>
             </a:xfrm>
             <a:prstGeom prst="ellipse">
@@ -3736,7 +4032,7 @@
           </p:nvSpPr>
           <p:spPr>
             <a:xfrm>
-              <a:off x="4751525" y="3172713"/>
+              <a:off x="4280037" y="3172713"/>
               <a:ext cx="144506" cy="144506"/>
             </a:xfrm>
             <a:prstGeom prst="ellipse">
@@ -3773,7 +4069,7 @@
           </p:nvSpPr>
           <p:spPr>
             <a:xfrm>
-              <a:off x="4751525" y="3392169"/>
+              <a:off x="4280037" y="3392169"/>
               <a:ext cx="144506" cy="144506"/>
             </a:xfrm>
             <a:prstGeom prst="ellipse">
@@ -3810,7 +4106,7 @@
           </p:nvSpPr>
           <p:spPr>
             <a:xfrm>
-              <a:off x="4751525" y="3611625"/>
+              <a:off x="4280037" y="3611625"/>
               <a:ext cx="144506" cy="144506"/>
             </a:xfrm>
             <a:prstGeom prst="ellipse">
@@ -3847,7 +4143,7 @@
           </p:nvSpPr>
           <p:spPr>
             <a:xfrm>
-              <a:off x="5003095" y="2082802"/>
+              <a:off x="4531607" y="2082802"/>
               <a:ext cx="416262" cy="104884"/>
             </a:xfrm>
             <a:prstGeom prst="rect">
@@ -3880,7 +4176,7 @@
                   <a:latin typeface="Arial"/>
                   <a:cs typeface="Arial"/>
                 </a:rPr>
-                <a:t>1 (2035)</a:t>
+                <a:t>1 (2033)</a:t>
               </a:r>
             </a:p>
           </p:txBody>
@@ -3893,7 +4189,7 @@
           </p:nvSpPr>
           <p:spPr>
             <a:xfrm>
-              <a:off x="5003095" y="2302258"/>
+              <a:off x="4531607" y="2302258"/>
               <a:ext cx="354106" cy="104884"/>
             </a:xfrm>
             <a:prstGeom prst="rect">
@@ -3939,7 +4235,7 @@
           </p:nvSpPr>
           <p:spPr>
             <a:xfrm>
-              <a:off x="5003095" y="2521714"/>
+              <a:off x="4531607" y="2521714"/>
               <a:ext cx="291951" cy="104884"/>
             </a:xfrm>
             <a:prstGeom prst="rect">
@@ -3972,7 +4268,7 @@
                   <a:latin typeface="Arial"/>
                   <a:cs typeface="Arial"/>
                 </a:rPr>
-                <a:t>3 (51)</a:t>
+                <a:t>3 (50)</a:t>
               </a:r>
             </a:p>
           </p:txBody>
@@ -3985,7 +4281,7 @@
           </p:nvSpPr>
           <p:spPr>
             <a:xfrm>
-              <a:off x="5003095" y="2741170"/>
+              <a:off x="4531607" y="2741170"/>
               <a:ext cx="291951" cy="104884"/>
             </a:xfrm>
             <a:prstGeom prst="rect">
@@ -4031,7 +4327,7 @@
           </p:nvSpPr>
           <p:spPr>
             <a:xfrm>
-              <a:off x="5003095" y="2960626"/>
+              <a:off x="4531607" y="2960626"/>
               <a:ext cx="229795" cy="104884"/>
             </a:xfrm>
             <a:prstGeom prst="rect">
@@ -4064,7 +4360,7 @@
                   <a:latin typeface="Arial"/>
                   <a:cs typeface="Arial"/>
                 </a:rPr>
-                <a:t>5 (8)</a:t>
+                <a:t>5 (9)</a:t>
               </a:r>
             </a:p>
           </p:txBody>
@@ -4077,7 +4373,7 @@
           </p:nvSpPr>
           <p:spPr>
             <a:xfrm>
-              <a:off x="5003095" y="3180082"/>
+              <a:off x="4531607" y="3180082"/>
               <a:ext cx="229795" cy="104884"/>
             </a:xfrm>
             <a:prstGeom prst="rect">
@@ -4123,7 +4419,7 @@
           </p:nvSpPr>
           <p:spPr>
             <a:xfrm>
-              <a:off x="5003095" y="3399538"/>
+              <a:off x="4531607" y="3399538"/>
               <a:ext cx="229795" cy="104884"/>
             </a:xfrm>
             <a:prstGeom prst="rect">
@@ -4169,7 +4465,7 @@
           </p:nvSpPr>
           <p:spPr>
             <a:xfrm>
-              <a:off x="5003095" y="3618994"/>
+              <a:off x="4531607" y="3618994"/>
               <a:ext cx="229795" cy="104884"/>
             </a:xfrm>
             <a:prstGeom prst="rect">

</xml_diff>